<commit_message>
minor changes to the power point
</commit_message>
<xml_diff>
--- a/BlazorDemo/BlazorDemo/presentation/ASP.pptx
+++ b/BlazorDemo/BlazorDemo/presentation/ASP.pptx
@@ -24,6 +24,8 @@
     <p:sldId id="273" r:id="rId18"/>
     <p:sldId id="272" r:id="rId19"/>
     <p:sldId id="274" r:id="rId20"/>
+    <p:sldId id="275" r:id="rId21"/>
+    <p:sldId id="276" r:id="rId22"/>
   </p:sldIdLst>
   <p:sldSz cx="12192000" cy="6858000"/>
   <p:notesSz cx="6858000" cy="9144000"/>
@@ -277,7 +279,7 @@
           <a:p>
             <a:fld id="{5E8FFF51-1F21-4021-8F6D-94DA76CCD317}" type="datetimeFigureOut">
               <a:rPr lang="en-US" smtClean="0"/>
-              <a:t>7/2/2023</a:t>
+              <a:t>7/3/2023</a:t>
             </a:fld>
             <a:endParaRPr lang="en-US"/>
           </a:p>
@@ -475,7 +477,7 @@
           <a:p>
             <a:fld id="{5E8FFF51-1F21-4021-8F6D-94DA76CCD317}" type="datetimeFigureOut">
               <a:rPr lang="en-US" smtClean="0"/>
-              <a:t>7/2/2023</a:t>
+              <a:t>7/3/2023</a:t>
             </a:fld>
             <a:endParaRPr lang="en-US"/>
           </a:p>
@@ -683,7 +685,7 @@
           <a:p>
             <a:fld id="{5E8FFF51-1F21-4021-8F6D-94DA76CCD317}" type="datetimeFigureOut">
               <a:rPr lang="en-US" smtClean="0"/>
-              <a:t>7/2/2023</a:t>
+              <a:t>7/3/2023</a:t>
             </a:fld>
             <a:endParaRPr lang="en-US"/>
           </a:p>
@@ -881,7 +883,7 @@
           <a:p>
             <a:fld id="{5E8FFF51-1F21-4021-8F6D-94DA76CCD317}" type="datetimeFigureOut">
               <a:rPr lang="en-US" smtClean="0"/>
-              <a:t>7/2/2023</a:t>
+              <a:t>7/3/2023</a:t>
             </a:fld>
             <a:endParaRPr lang="en-US"/>
           </a:p>
@@ -1156,7 +1158,7 @@
           <a:p>
             <a:fld id="{5E8FFF51-1F21-4021-8F6D-94DA76CCD317}" type="datetimeFigureOut">
               <a:rPr lang="en-US" smtClean="0"/>
-              <a:t>7/2/2023</a:t>
+              <a:t>7/3/2023</a:t>
             </a:fld>
             <a:endParaRPr lang="en-US"/>
           </a:p>
@@ -1421,7 +1423,7 @@
           <a:p>
             <a:fld id="{5E8FFF51-1F21-4021-8F6D-94DA76CCD317}" type="datetimeFigureOut">
               <a:rPr lang="en-US" smtClean="0"/>
-              <a:t>7/2/2023</a:t>
+              <a:t>7/3/2023</a:t>
             </a:fld>
             <a:endParaRPr lang="en-US"/>
           </a:p>
@@ -1833,7 +1835,7 @@
           <a:p>
             <a:fld id="{5E8FFF51-1F21-4021-8F6D-94DA76CCD317}" type="datetimeFigureOut">
               <a:rPr lang="en-US" smtClean="0"/>
-              <a:t>7/2/2023</a:t>
+              <a:t>7/3/2023</a:t>
             </a:fld>
             <a:endParaRPr lang="en-US"/>
           </a:p>
@@ -1974,7 +1976,7 @@
           <a:p>
             <a:fld id="{5E8FFF51-1F21-4021-8F6D-94DA76CCD317}" type="datetimeFigureOut">
               <a:rPr lang="en-US" smtClean="0"/>
-              <a:t>7/2/2023</a:t>
+              <a:t>7/3/2023</a:t>
             </a:fld>
             <a:endParaRPr lang="en-US"/>
           </a:p>
@@ -2087,7 +2089,7 @@
           <a:p>
             <a:fld id="{5E8FFF51-1F21-4021-8F6D-94DA76CCD317}" type="datetimeFigureOut">
               <a:rPr lang="en-US" smtClean="0"/>
-              <a:t>7/2/2023</a:t>
+              <a:t>7/3/2023</a:t>
             </a:fld>
             <a:endParaRPr lang="en-US"/>
           </a:p>
@@ -2398,7 +2400,7 @@
           <a:p>
             <a:fld id="{5E8FFF51-1F21-4021-8F6D-94DA76CCD317}" type="datetimeFigureOut">
               <a:rPr lang="en-US" smtClean="0"/>
-              <a:t>7/2/2023</a:t>
+              <a:t>7/3/2023</a:t>
             </a:fld>
             <a:endParaRPr lang="en-US"/>
           </a:p>
@@ -2686,7 +2688,7 @@
           <a:p>
             <a:fld id="{5E8FFF51-1F21-4021-8F6D-94DA76CCD317}" type="datetimeFigureOut">
               <a:rPr lang="en-US" smtClean="0"/>
-              <a:t>7/2/2023</a:t>
+              <a:t>7/3/2023</a:t>
             </a:fld>
             <a:endParaRPr lang="en-US"/>
           </a:p>
@@ -2927,7 +2929,7 @@
           <a:p>
             <a:fld id="{5E8FFF51-1F21-4021-8F6D-94DA76CCD317}" type="datetimeFigureOut">
               <a:rPr lang="en-US" smtClean="0"/>
-              <a:t>7/2/2023</a:t>
+              <a:t>7/3/2023</a:t>
             </a:fld>
             <a:endParaRPr lang="en-US"/>
           </a:p>
@@ -4488,6 +4490,173 @@
 </p:sld>
 </file>
 
+<file path=ppt/slides/slide20.xml><?xml version="1.0" encoding="utf-8"?>
+<p:sld xmlns:a="http://schemas.openxmlformats.org/drawingml/2006/main" xmlns:r="http://schemas.openxmlformats.org/officeDocument/2006/relationships" xmlns:p="http://schemas.openxmlformats.org/presentationml/2006/main">
+  <p:cSld>
+    <p:spTree>
+      <p:nvGrpSpPr>
+        <p:cNvPr id="1" name=""/>
+        <p:cNvGrpSpPr/>
+        <p:nvPr/>
+      </p:nvGrpSpPr>
+      <p:grpSpPr>
+        <a:xfrm>
+          <a:off x="0" y="0"/>
+          <a:ext cx="0" cy="0"/>
+          <a:chOff x="0" y="0"/>
+          <a:chExt cx="0" cy="0"/>
+        </a:xfrm>
+      </p:grpSpPr>
+      <p:sp>
+        <p:nvSpPr>
+          <p:cNvPr id="2" name="Title 1">
+            <a:extLst>
+              <a:ext uri="{FF2B5EF4-FFF2-40B4-BE49-F238E27FC236}">
+                <a16:creationId xmlns:a16="http://schemas.microsoft.com/office/drawing/2014/main" id="{9B2585A5-781E-8772-E5BE-B375B3B4C1C8}"/>
+              </a:ext>
+            </a:extLst>
+          </p:cNvPr>
+          <p:cNvSpPr>
+            <a:spLocks noGrp="1"/>
+          </p:cNvSpPr>
+          <p:nvPr>
+            <p:ph type="title"/>
+          </p:nvPr>
+        </p:nvSpPr>
+        <p:spPr/>
+        <p:txBody>
+          <a:bodyPr/>
+          <a:lstStyle/>
+          <a:p>
+            <a:r>
+              <a:rPr lang="en-US" altLang="zh-CN" dirty="0"/>
+              <a:t>Demo</a:t>
+            </a:r>
+            <a:endParaRPr lang="en-US" dirty="0"/>
+          </a:p>
+        </p:txBody>
+      </p:sp>
+      <p:sp>
+        <p:nvSpPr>
+          <p:cNvPr id="3" name="Text Placeholder 2">
+            <a:extLst>
+              <a:ext uri="{FF2B5EF4-FFF2-40B4-BE49-F238E27FC236}">
+                <a16:creationId xmlns:a16="http://schemas.microsoft.com/office/drawing/2014/main" id="{A154F807-08D0-9808-9FDB-075078A9ADF3}"/>
+              </a:ext>
+            </a:extLst>
+          </p:cNvPr>
+          <p:cNvSpPr>
+            <a:spLocks noGrp="1"/>
+          </p:cNvSpPr>
+          <p:nvPr>
+            <p:ph type="body" idx="1"/>
+          </p:nvPr>
+        </p:nvSpPr>
+        <p:spPr/>
+        <p:txBody>
+          <a:bodyPr/>
+          <a:lstStyle/>
+          <a:p>
+            <a:endParaRPr lang="en-US"/>
+          </a:p>
+        </p:txBody>
+      </p:sp>
+    </p:spTree>
+    <p:extLst>
+      <p:ext uri="{BB962C8B-B14F-4D97-AF65-F5344CB8AC3E}">
+        <p14:creationId xmlns:p14="http://schemas.microsoft.com/office/powerpoint/2010/main" val="973539659"/>
+      </p:ext>
+    </p:extLst>
+  </p:cSld>
+  <p:clrMapOvr>
+    <a:masterClrMapping/>
+  </p:clrMapOvr>
+</p:sld>
+</file>
+
+<file path=ppt/slides/slide21.xml><?xml version="1.0" encoding="utf-8"?>
+<p:sld xmlns:a="http://schemas.openxmlformats.org/drawingml/2006/main" xmlns:r="http://schemas.openxmlformats.org/officeDocument/2006/relationships" xmlns:p="http://schemas.openxmlformats.org/presentationml/2006/main">
+  <p:cSld>
+    <p:spTree>
+      <p:nvGrpSpPr>
+        <p:cNvPr id="1" name=""/>
+        <p:cNvGrpSpPr/>
+        <p:nvPr/>
+      </p:nvGrpSpPr>
+      <p:grpSpPr>
+        <a:xfrm>
+          <a:off x="0" y="0"/>
+          <a:ext cx="0" cy="0"/>
+          <a:chOff x="0" y="0"/>
+          <a:chExt cx="0" cy="0"/>
+        </a:xfrm>
+      </p:grpSpPr>
+      <p:sp>
+        <p:nvSpPr>
+          <p:cNvPr id="2" name="Title 1">
+            <a:extLst>
+              <a:ext uri="{FF2B5EF4-FFF2-40B4-BE49-F238E27FC236}">
+                <a16:creationId xmlns:a16="http://schemas.microsoft.com/office/drawing/2014/main" id="{5D8B6969-D692-37CB-6853-31A570D1EDA5}"/>
+              </a:ext>
+            </a:extLst>
+          </p:cNvPr>
+          <p:cNvSpPr>
+            <a:spLocks noGrp="1"/>
+          </p:cNvSpPr>
+          <p:nvPr>
+            <p:ph type="ctrTitle"/>
+          </p:nvPr>
+        </p:nvSpPr>
+        <p:spPr/>
+        <p:txBody>
+          <a:bodyPr/>
+          <a:lstStyle/>
+          <a:p>
+            <a:r>
+              <a:rPr lang="en-US"/>
+              <a:t>The End</a:t>
+            </a:r>
+          </a:p>
+        </p:txBody>
+      </p:sp>
+      <p:sp>
+        <p:nvSpPr>
+          <p:cNvPr id="3" name="Subtitle 2">
+            <a:extLst>
+              <a:ext uri="{FF2B5EF4-FFF2-40B4-BE49-F238E27FC236}">
+                <a16:creationId xmlns:a16="http://schemas.microsoft.com/office/drawing/2014/main" id="{56C07217-4591-F253-7BB5-A7FC6CA51F99}"/>
+              </a:ext>
+            </a:extLst>
+          </p:cNvPr>
+          <p:cNvSpPr>
+            <a:spLocks noGrp="1"/>
+          </p:cNvSpPr>
+          <p:nvPr>
+            <p:ph type="subTitle" idx="1"/>
+          </p:nvPr>
+        </p:nvSpPr>
+        <p:spPr/>
+        <p:txBody>
+          <a:bodyPr/>
+          <a:lstStyle/>
+          <a:p>
+            <a:endParaRPr lang="en-US"/>
+          </a:p>
+        </p:txBody>
+      </p:sp>
+    </p:spTree>
+    <p:extLst>
+      <p:ext uri="{BB962C8B-B14F-4D97-AF65-F5344CB8AC3E}">
+        <p14:creationId xmlns:p14="http://schemas.microsoft.com/office/powerpoint/2010/main" val="3922214365"/>
+      </p:ext>
+    </p:extLst>
+  </p:cSld>
+  <p:clrMapOvr>
+    <a:masterClrMapping/>
+  </p:clrMapOvr>
+</p:sld>
+</file>
+
 <file path=ppt/slides/slide3.xml><?xml version="1.0" encoding="utf-8"?>
 <p:sld xmlns:a="http://schemas.openxmlformats.org/drawingml/2006/main" xmlns:r="http://schemas.openxmlformats.org/officeDocument/2006/relationships" xmlns:p="http://schemas.openxmlformats.org/presentationml/2006/main">
   <p:cSld>

</xml_diff>